<commit_message>
Update presentation Serverless 2024
</commit_message>
<xml_diff>
--- a/Lab7-Serverless/Serverless-computing.pptx
+++ b/Lab7-Serverless/Serverless-computing.pptx
@@ -9,8 +9,8 @@
   </p:notesMasterIdLst>
   <p:sldIdLst>
     <p:sldId id="256" r:id="rId2"/>
-    <p:sldId id="318" r:id="rId3"/>
-    <p:sldId id="319" r:id="rId4"/>
+    <p:sldId id="319" r:id="rId3"/>
+    <p:sldId id="331" r:id="rId4"/>
     <p:sldId id="320" r:id="rId5"/>
     <p:sldId id="322" r:id="rId6"/>
     <p:sldId id="321" r:id="rId7"/>
@@ -252,7 +252,7 @@
             <a:fld id="{A74C3DD1-6B4C-423E-A696-BD4124EC33BC}" type="datetimeFigureOut">
               <a:rPr lang="cs-CZ" smtClean="0"/>
               <a:pPr/>
-              <a:t>28.03.2023</a:t>
+              <a:t>13.03.2024</a:t>
             </a:fld>
             <a:endParaRPr lang="cs-CZ" dirty="0"/>
           </a:p>
@@ -566,40 +566,319 @@
           <a:lstStyle/>
           <a:p>
             <a:r>
-              <a:rPr lang="cs-CZ" dirty="0"/>
-              <a:t>On-Premise = starám se o vše, musím řešit škálování hardware</a:t>
-            </a:r>
-          </a:p>
-          <a:p>
-            <a:r>
-              <a:rPr lang="cs-CZ" dirty="0" err="1"/>
+              <a:rPr lang="en-US" dirty="0"/>
+              <a:t>On-Premises / Data-</a:t>
+            </a:r>
+            <a:r>
+              <a:rPr lang="en-US" dirty="0" err="1"/>
+              <a:t>centr</a:t>
+            </a:r>
+            <a:r>
+              <a:rPr lang="cs-CZ" dirty="0"/>
+              <a:t>e</a:t>
+            </a:r>
+            <a:endParaRPr lang="en-US" dirty="0"/>
+          </a:p>
+          <a:p>
+            <a:pPr lvl="1"/>
+            <a:r>
+              <a:rPr lang="en-US" dirty="0"/>
+              <a:t>Hardwar</a:t>
+            </a:r>
+            <a:r>
+              <a:rPr lang="cs-CZ" dirty="0"/>
+              <a:t>e </a:t>
+            </a:r>
+            <a:r>
+              <a:rPr lang="cs-CZ" dirty="0" err="1"/>
+              <a:t>is</a:t>
+            </a:r>
+            <a:r>
+              <a:rPr lang="cs-CZ" dirty="0"/>
+              <a:t> </a:t>
+            </a:r>
+            <a:r>
+              <a:rPr lang="cs-CZ" dirty="0" err="1"/>
+              <a:t>the</a:t>
+            </a:r>
+            <a:r>
+              <a:rPr lang="cs-CZ" dirty="0"/>
+              <a:t> unit </a:t>
+            </a:r>
+            <a:r>
+              <a:rPr lang="cs-CZ" dirty="0" err="1"/>
+              <a:t>of</a:t>
+            </a:r>
+            <a:r>
+              <a:rPr lang="cs-CZ" dirty="0"/>
+              <a:t> </a:t>
+            </a:r>
+            <a:r>
+              <a:rPr lang="cs-CZ" dirty="0" err="1"/>
+              <a:t>scale</a:t>
+            </a:r>
+            <a:endParaRPr lang="en-US" dirty="0"/>
+          </a:p>
+          <a:p>
+            <a:pPr lvl="1"/>
+            <a:r>
+              <a:rPr lang="en-US" dirty="0"/>
+              <a:t>Abstracts the physical hosting environment</a:t>
+            </a:r>
+          </a:p>
+          <a:p>
+            <a:r>
+              <a:rPr lang="en-US" dirty="0"/>
               <a:t>IaaS</a:t>
             </a:r>
-            <a:r>
-              <a:rPr lang="cs-CZ" dirty="0"/>
-              <a:t> = VPS</a:t>
-            </a:r>
-          </a:p>
-          <a:p>
-            <a:r>
-              <a:rPr lang="cs-CZ" dirty="0" err="1"/>
+            <a:endParaRPr lang="cs-CZ" dirty="0"/>
+          </a:p>
+          <a:p>
+            <a:pPr lvl="1"/>
+            <a:r>
+              <a:rPr lang="cs-CZ" dirty="0" err="1"/>
+              <a:t>Operating</a:t>
+            </a:r>
+            <a:r>
+              <a:rPr lang="cs-CZ" dirty="0"/>
+              <a:t> </a:t>
+            </a:r>
+            <a:r>
+              <a:rPr lang="en-US" dirty="0"/>
+              <a:t>system</a:t>
+            </a:r>
+            <a:r>
+              <a:rPr lang="cs-CZ" dirty="0"/>
+              <a:t> </a:t>
+            </a:r>
+            <a:r>
+              <a:rPr lang="cs-CZ" dirty="0" err="1"/>
+              <a:t>is</a:t>
+            </a:r>
+            <a:r>
+              <a:rPr lang="cs-CZ" dirty="0"/>
+              <a:t> </a:t>
+            </a:r>
+            <a:r>
+              <a:rPr lang="cs-CZ" dirty="0" err="1"/>
+              <a:t>the</a:t>
+            </a:r>
+            <a:r>
+              <a:rPr lang="cs-CZ" dirty="0"/>
+              <a:t> unit </a:t>
+            </a:r>
+            <a:r>
+              <a:rPr lang="cs-CZ" dirty="0" err="1"/>
+              <a:t>of</a:t>
+            </a:r>
+            <a:r>
+              <a:rPr lang="cs-CZ" dirty="0"/>
+              <a:t> </a:t>
+            </a:r>
+            <a:r>
+              <a:rPr lang="cs-CZ" dirty="0" err="1"/>
+              <a:t>scale</a:t>
+            </a:r>
+            <a:endParaRPr lang="cs-CZ" dirty="0"/>
+          </a:p>
+          <a:p>
+            <a:pPr lvl="1"/>
+            <a:r>
+              <a:rPr lang="cs-CZ" dirty="0" err="1"/>
+              <a:t>Abstracts</a:t>
+            </a:r>
+            <a:r>
+              <a:rPr lang="cs-CZ" dirty="0"/>
+              <a:t> </a:t>
+            </a:r>
+            <a:r>
+              <a:rPr lang="cs-CZ" dirty="0" err="1"/>
+              <a:t>the</a:t>
+            </a:r>
+            <a:r>
+              <a:rPr lang="cs-CZ" dirty="0"/>
+              <a:t> hardware</a:t>
+            </a:r>
+            <a:endParaRPr lang="en-US" dirty="0"/>
+          </a:p>
+          <a:p>
+            <a:r>
+              <a:rPr lang="en-US" dirty="0"/>
               <a:t>PaaS</a:t>
             </a:r>
-            <a:r>
-              <a:rPr lang="cs-CZ" dirty="0"/>
-              <a:t> = různé části v různých programovacích jazycích?</a:t>
-            </a:r>
-          </a:p>
-          <a:p>
-            <a:r>
-              <a:rPr lang="cs-CZ" dirty="0" err="1"/>
+            <a:endParaRPr lang="cs-CZ" dirty="0"/>
+          </a:p>
+          <a:p>
+            <a:pPr lvl="1"/>
+            <a:r>
+              <a:rPr lang="cs-CZ" dirty="0" err="1"/>
+              <a:t>Application</a:t>
+            </a:r>
+            <a:r>
+              <a:rPr lang="cs-CZ" dirty="0"/>
+              <a:t> </a:t>
+            </a:r>
+            <a:r>
+              <a:rPr lang="cs-CZ" dirty="0" err="1"/>
+              <a:t>is</a:t>
+            </a:r>
+            <a:r>
+              <a:rPr lang="cs-CZ" dirty="0"/>
+              <a:t> </a:t>
+            </a:r>
+            <a:r>
+              <a:rPr lang="cs-CZ" dirty="0" err="1"/>
+              <a:t>the</a:t>
+            </a:r>
+            <a:r>
+              <a:rPr lang="cs-CZ" dirty="0"/>
+              <a:t> unit </a:t>
+            </a:r>
+            <a:r>
+              <a:rPr lang="cs-CZ" dirty="0" err="1"/>
+              <a:t>of</a:t>
+            </a:r>
+            <a:r>
+              <a:rPr lang="cs-CZ" dirty="0"/>
+              <a:t> </a:t>
+            </a:r>
+            <a:r>
+              <a:rPr lang="cs-CZ" dirty="0" err="1"/>
+              <a:t>scale</a:t>
+            </a:r>
+            <a:endParaRPr lang="cs-CZ" dirty="0"/>
+          </a:p>
+          <a:p>
+            <a:pPr lvl="1"/>
+            <a:r>
+              <a:rPr lang="cs-CZ" dirty="0" err="1"/>
+              <a:t>Abstracts</a:t>
+            </a:r>
+            <a:r>
+              <a:rPr lang="cs-CZ" dirty="0"/>
+              <a:t> </a:t>
+            </a:r>
+            <a:r>
+              <a:rPr lang="cs-CZ" dirty="0" err="1"/>
+              <a:t>the</a:t>
+            </a:r>
+            <a:r>
+              <a:rPr lang="cs-CZ" dirty="0"/>
+              <a:t> </a:t>
+            </a:r>
+            <a:r>
+              <a:rPr lang="cs-CZ" dirty="0" err="1"/>
+              <a:t>Operating</a:t>
+            </a:r>
+            <a:r>
+              <a:rPr lang="cs-CZ" dirty="0"/>
+              <a:t> </a:t>
+            </a:r>
+            <a:r>
+              <a:rPr lang="cs-CZ" dirty="0" err="1"/>
+              <a:t>Syst</a:t>
+            </a:r>
+            <a:r>
+              <a:rPr lang="en-US" dirty="0"/>
+              <a:t>e</a:t>
+            </a:r>
+            <a:r>
+              <a:rPr lang="cs-CZ" dirty="0"/>
+              <a:t>m</a:t>
+            </a:r>
+            <a:endParaRPr lang="en-US" dirty="0"/>
+          </a:p>
+          <a:p>
+            <a:r>
+              <a:rPr lang="en-US" dirty="0"/>
+              <a:t>SaaS</a:t>
+            </a:r>
+          </a:p>
+          <a:p>
+            <a:pPr lvl="1"/>
+            <a:r>
+              <a:rPr lang="en-US" dirty="0"/>
+              <a:t>Cloud-hosted application ready-to-use</a:t>
+            </a:r>
+          </a:p>
+          <a:p>
+            <a:r>
+              <a:rPr lang="en-US" dirty="0"/>
               <a:t>Serverless</a:t>
             </a:r>
-            <a:r>
-              <a:rPr lang="cs-CZ" dirty="0"/>
-              <a:t> = server nás nezajímá. OS nás nezajímá, verze ničeho nás nezajímá</a:t>
+            <a:endParaRPr lang="cs-CZ" dirty="0"/>
+          </a:p>
+          <a:p>
+            <a:pPr lvl="1"/>
+            <a:r>
+              <a:rPr lang="cs-CZ" dirty="0" err="1"/>
+              <a:t>Function</a:t>
+            </a:r>
+            <a:r>
+              <a:rPr lang="cs-CZ" dirty="0"/>
+              <a:t> </a:t>
+            </a:r>
+            <a:r>
+              <a:rPr lang="cs-CZ" dirty="0" err="1"/>
+              <a:t>is</a:t>
+            </a:r>
+            <a:r>
+              <a:rPr lang="cs-CZ" dirty="0"/>
+              <a:t> </a:t>
+            </a:r>
+            <a:r>
+              <a:rPr lang="cs-CZ" dirty="0" err="1"/>
+              <a:t>the</a:t>
+            </a:r>
+            <a:r>
+              <a:rPr lang="cs-CZ" dirty="0"/>
+              <a:t> unit </a:t>
+            </a:r>
+            <a:r>
+              <a:rPr lang="cs-CZ" dirty="0" err="1"/>
+              <a:t>of</a:t>
+            </a:r>
+            <a:r>
+              <a:rPr lang="cs-CZ" dirty="0"/>
+              <a:t> </a:t>
+            </a:r>
+            <a:r>
+              <a:rPr lang="cs-CZ" dirty="0" err="1"/>
+              <a:t>scale</a:t>
+            </a:r>
+            <a:endParaRPr lang="cs-CZ" dirty="0"/>
+          </a:p>
+          <a:p>
+            <a:pPr lvl="1"/>
+            <a:r>
+              <a:rPr lang="cs-CZ" dirty="0" err="1"/>
+              <a:t>Abstracts</a:t>
+            </a:r>
+            <a:r>
+              <a:rPr lang="cs-CZ" dirty="0"/>
+              <a:t> </a:t>
+            </a:r>
+            <a:r>
+              <a:rPr lang="cs-CZ" dirty="0" err="1"/>
+              <a:t>the</a:t>
+            </a:r>
+            <a:r>
+              <a:rPr lang="cs-CZ" dirty="0"/>
+              <a:t> </a:t>
+            </a:r>
+            <a:r>
+              <a:rPr lang="cs-CZ" dirty="0" err="1"/>
+              <a:t>language</a:t>
+            </a:r>
+            <a:r>
+              <a:rPr lang="cs-CZ" dirty="0"/>
+              <a:t> runtime</a:t>
             </a:r>
             <a:endParaRPr lang="en-US" dirty="0"/>
+          </a:p>
+          <a:p>
+            <a:pPr lvl="1"/>
+            <a:endParaRPr lang="cs-CZ" dirty="0"/>
           </a:p>
         </p:txBody>
       </p:sp>
@@ -621,7 +900,7 @@
             <a:fld id="{A16764F6-20DF-4459-862B-64827B1A3974}" type="slidenum">
               <a:rPr lang="cs-CZ" smtClean="0"/>
               <a:pPr/>
-              <a:t>2</a:t>
+              <a:t>3</a:t>
             </a:fld>
             <a:endParaRPr lang="cs-CZ" dirty="0"/>
           </a:p>
@@ -630,7 +909,7 @@
     </p:spTree>
     <p:extLst>
       <p:ext uri="{BB962C8B-B14F-4D97-AF65-F5344CB8AC3E}">
-        <p14:creationId xmlns:p14="http://schemas.microsoft.com/office/powerpoint/2010/main" val="3614616419"/>
+        <p14:creationId xmlns:p14="http://schemas.microsoft.com/office/powerpoint/2010/main" val="3700119231"/>
       </p:ext>
     </p:extLst>
   </p:cSld>
@@ -684,6 +963,333 @@
           <a:bodyPr/>
           <a:lstStyle/>
           <a:p>
+            <a:pPr algn="l">
+              <a:buFont typeface="+mj-lt"/>
+              <a:buAutoNum type="arabicPeriod"/>
+            </a:pPr>
+            <a:r>
+              <a:rPr lang="cs-CZ" b="1" i="0" dirty="0">
+                <a:effectLst/>
+                <a:latin typeface="Söhne"/>
+              </a:rPr>
+              <a:t>Azure Event </a:t>
+            </a:r>
+            <a:r>
+              <a:rPr lang="cs-CZ" b="1" i="0" dirty="0" err="1">
+                <a:effectLst/>
+                <a:latin typeface="Söhne"/>
+              </a:rPr>
+              <a:t>Grid</a:t>
+            </a:r>
+            <a:r>
+              <a:rPr lang="cs-CZ" b="0" i="0" dirty="0">
+                <a:effectLst/>
+                <a:latin typeface="Söhne"/>
+              </a:rPr>
+              <a:t>:</a:t>
+            </a:r>
+          </a:p>
+          <a:p>
+            <a:pPr marL="742950" lvl="1" indent="-285750" algn="l">
+              <a:buFont typeface="+mj-lt"/>
+              <a:buAutoNum type="arabicPeriod"/>
+            </a:pPr>
+            <a:r>
+              <a:rPr lang="cs-CZ" b="0" i="0" dirty="0">
+                <a:effectLst/>
+                <a:latin typeface="Söhne"/>
+              </a:rPr>
+              <a:t>Azure Event </a:t>
+            </a:r>
+            <a:r>
+              <a:rPr lang="cs-CZ" b="0" i="0" dirty="0" err="1">
+                <a:effectLst/>
+                <a:latin typeface="Söhne"/>
+              </a:rPr>
+              <a:t>Grid</a:t>
+            </a:r>
+            <a:r>
+              <a:rPr lang="cs-CZ" b="0" i="0" dirty="0">
+                <a:effectLst/>
+                <a:latin typeface="Söhne"/>
+              </a:rPr>
+              <a:t> je služba určená pro správu a směrování událostí v rámci Azure.</a:t>
+            </a:r>
+          </a:p>
+          <a:p>
+            <a:pPr marL="742950" lvl="1" indent="-285750" algn="l">
+              <a:buFont typeface="+mj-lt"/>
+              <a:buAutoNum type="arabicPeriod"/>
+            </a:pPr>
+            <a:r>
+              <a:rPr lang="cs-CZ" b="0" i="0" dirty="0">
+                <a:effectLst/>
+                <a:latin typeface="Söhne"/>
+              </a:rPr>
+              <a:t>Je navržena tak, aby umožňovala jednoduché nasazení publikace-odběru událostí, kde se události z různých služeb Azure (nebo vlastních aplikací) publikují a odběratelé se přihlašují k odběru konkrétních událostí nebo typů událostí.</a:t>
+            </a:r>
+          </a:p>
+          <a:p>
+            <a:pPr marL="742950" lvl="1" indent="-285750" algn="l">
+              <a:buFont typeface="+mj-lt"/>
+              <a:buAutoNum type="arabicPeriod"/>
+            </a:pPr>
+            <a:r>
+              <a:rPr lang="cs-CZ" b="0" i="0" dirty="0">
+                <a:effectLst/>
+                <a:latin typeface="Söhne"/>
+              </a:rPr>
+              <a:t>Je vhodná pro scénáře, kde potřebujete reagovat na události z různých zdrojů v rámci Azure a provádět řízení toku událostí, například pro spouštění automatizovaných reakcí na události.</a:t>
+            </a:r>
+          </a:p>
+          <a:p>
+            <a:pPr algn="l">
+              <a:buFont typeface="+mj-lt"/>
+              <a:buAutoNum type="arabicPeriod"/>
+            </a:pPr>
+            <a:r>
+              <a:rPr lang="cs-CZ" b="1" i="0" dirty="0">
+                <a:effectLst/>
+                <a:latin typeface="Söhne"/>
+              </a:rPr>
+              <a:t>Azure Event Hub</a:t>
+            </a:r>
+            <a:r>
+              <a:rPr lang="cs-CZ" b="0" i="0" dirty="0">
+                <a:effectLst/>
+                <a:latin typeface="Söhne"/>
+              </a:rPr>
+              <a:t>:</a:t>
+            </a:r>
+          </a:p>
+          <a:p>
+            <a:pPr marL="742950" lvl="1" indent="-285750" algn="l">
+              <a:buFont typeface="+mj-lt"/>
+              <a:buAutoNum type="arabicPeriod"/>
+            </a:pPr>
+            <a:r>
+              <a:rPr lang="cs-CZ" b="0" i="0" dirty="0">
+                <a:effectLst/>
+                <a:latin typeface="Söhne"/>
+              </a:rPr>
+              <a:t>Azure Event Hub je plně řízená služba pro zpracování a ukládání velkého objemu událostí a dat v reálném čase.</a:t>
+            </a:r>
+          </a:p>
+          <a:p>
+            <a:pPr marL="742950" lvl="1" indent="-285750" algn="l">
+              <a:buFont typeface="+mj-lt"/>
+              <a:buAutoNum type="arabicPeriod"/>
+            </a:pPr>
+            <a:r>
+              <a:rPr lang="cs-CZ" b="0" i="0" dirty="0">
+                <a:effectLst/>
+                <a:latin typeface="Söhne"/>
+              </a:rPr>
+              <a:t>Je optimalizována pro zpracování velkého počtu událostí (např. </a:t>
+            </a:r>
+            <a:r>
+              <a:rPr lang="cs-CZ" b="0" i="0" dirty="0" err="1">
+                <a:effectLst/>
+                <a:latin typeface="Söhne"/>
+              </a:rPr>
+              <a:t>IoT</a:t>
+            </a:r>
+            <a:r>
+              <a:rPr lang="cs-CZ" b="0" i="0" dirty="0">
+                <a:effectLst/>
+                <a:latin typeface="Söhne"/>
+              </a:rPr>
+              <a:t> senzorová data, logy aplikací, telemetrie) s vysokou propustností a nízkou latencí.</a:t>
+            </a:r>
+          </a:p>
+          <a:p>
+            <a:pPr marL="742950" lvl="1" indent="-285750" algn="l">
+              <a:buFont typeface="+mj-lt"/>
+              <a:buAutoNum type="arabicPeriod"/>
+            </a:pPr>
+            <a:r>
+              <a:rPr lang="cs-CZ" b="0" i="0" dirty="0">
+                <a:effectLst/>
+                <a:latin typeface="Söhne"/>
+              </a:rPr>
+              <a:t>Poskytuje možnosti ukládání, zpracování a analýzy dat v reálném čase a integruje se s různými analytickými nástroji a úložišti dat v Azure (např. Azure Stream </a:t>
+            </a:r>
+            <a:r>
+              <a:rPr lang="cs-CZ" b="0" i="0" dirty="0" err="1">
+                <a:effectLst/>
+                <a:latin typeface="Söhne"/>
+              </a:rPr>
+              <a:t>Analytics</a:t>
+            </a:r>
+            <a:r>
+              <a:rPr lang="cs-CZ" b="0" i="0" dirty="0">
+                <a:effectLst/>
+                <a:latin typeface="Söhne"/>
+              </a:rPr>
+              <a:t>, Azure </a:t>
+            </a:r>
+            <a:r>
+              <a:rPr lang="cs-CZ" b="0" i="0" dirty="0" err="1">
+                <a:effectLst/>
+                <a:latin typeface="Söhne"/>
+              </a:rPr>
+              <a:t>Functions</a:t>
+            </a:r>
+            <a:r>
+              <a:rPr lang="cs-CZ" b="0" i="0" dirty="0">
+                <a:effectLst/>
+                <a:latin typeface="Söhne"/>
+              </a:rPr>
+              <a:t>, Azure </a:t>
+            </a:r>
+            <a:r>
+              <a:rPr lang="cs-CZ" b="0" i="0" dirty="0" err="1">
+                <a:effectLst/>
+                <a:latin typeface="Söhne"/>
+              </a:rPr>
+              <a:t>Blob</a:t>
+            </a:r>
+            <a:r>
+              <a:rPr lang="cs-CZ" b="0" i="0" dirty="0">
+                <a:effectLst/>
+                <a:latin typeface="Söhne"/>
+              </a:rPr>
+              <a:t> </a:t>
+            </a:r>
+            <a:r>
+              <a:rPr lang="cs-CZ" b="0" i="0" dirty="0" err="1">
+                <a:effectLst/>
+                <a:latin typeface="Söhne"/>
+              </a:rPr>
+              <a:t>Storage</a:t>
+            </a:r>
+            <a:r>
+              <a:rPr lang="cs-CZ" b="0" i="0" dirty="0">
+                <a:effectLst/>
+                <a:latin typeface="Söhne"/>
+              </a:rPr>
+              <a:t>).</a:t>
+            </a:r>
+          </a:p>
+          <a:p>
+            <a:pPr algn="l"/>
+            <a:r>
+              <a:rPr lang="cs-CZ" b="0" i="0" dirty="0">
+                <a:effectLst/>
+                <a:latin typeface="Söhne"/>
+              </a:rPr>
+              <a:t>Hlavní rozdíl spočívá tedy v tom, že Azure Event </a:t>
+            </a:r>
+            <a:r>
+              <a:rPr lang="cs-CZ" b="0" i="0" dirty="0" err="1">
+                <a:effectLst/>
+                <a:latin typeface="Söhne"/>
+              </a:rPr>
+              <a:t>Grid</a:t>
+            </a:r>
+            <a:r>
+              <a:rPr lang="cs-CZ" b="0" i="0" dirty="0">
+                <a:effectLst/>
+                <a:latin typeface="Söhne"/>
+              </a:rPr>
+              <a:t> je zaměřen na směrování a správu událostí mezi různými službami Azure a aplikacemi, zatímco Azure Event Hub je navržen pro příjem, ukládání a zpracování velkého objemu událostí v reálném čase, především pro analytické a zpracovatelské účely.</a:t>
+            </a:r>
+          </a:p>
+          <a:p>
+            <a:br>
+              <a:rPr lang="cs-CZ" b="0" i="0" dirty="0">
+                <a:solidFill>
+                  <a:srgbClr val="FFFFFF"/>
+                </a:solidFill>
+                <a:effectLst/>
+                <a:latin typeface="Söhne"/>
+              </a:rPr>
+            </a:br>
+            <a:endParaRPr lang="cs-CZ" dirty="0"/>
+          </a:p>
+        </p:txBody>
+      </p:sp>
+      <p:sp>
+        <p:nvSpPr>
+          <p:cNvPr id="4" name="Zástupný symbol pro číslo snímku 3"/>
+          <p:cNvSpPr>
+            <a:spLocks noGrp="1"/>
+          </p:cNvSpPr>
+          <p:nvPr>
+            <p:ph type="sldNum" sz="quarter" idx="5"/>
+          </p:nvPr>
+        </p:nvSpPr>
+        <p:spPr/>
+        <p:txBody>
+          <a:bodyPr/>
+          <a:lstStyle/>
+          <a:p>
+            <a:fld id="{A16764F6-20DF-4459-862B-64827B1A3974}" type="slidenum">
+              <a:rPr lang="cs-CZ" smtClean="0"/>
+              <a:pPr/>
+              <a:t>8</a:t>
+            </a:fld>
+            <a:endParaRPr lang="cs-CZ" dirty="0"/>
+          </a:p>
+        </p:txBody>
+      </p:sp>
+    </p:spTree>
+    <p:extLst>
+      <p:ext uri="{BB962C8B-B14F-4D97-AF65-F5344CB8AC3E}">
+        <p14:creationId xmlns:p14="http://schemas.microsoft.com/office/powerpoint/2010/main" val="3734487818"/>
+      </p:ext>
+    </p:extLst>
+  </p:cSld>
+  <p:clrMapOvr>
+    <a:masterClrMapping/>
+  </p:clrMapOvr>
+</p:notes>
+</file>
+
+<file path=ppt/notesSlides/notesSlide3.xml><?xml version="1.0" encoding="utf-8"?>
+<p:notes xmlns:a="http://schemas.openxmlformats.org/drawingml/2006/main" xmlns:r="http://schemas.openxmlformats.org/officeDocument/2006/relationships" xmlns:p="http://schemas.openxmlformats.org/presentationml/2006/main">
+  <p:cSld>
+    <p:spTree>
+      <p:nvGrpSpPr>
+        <p:cNvPr id="1" name=""/>
+        <p:cNvGrpSpPr/>
+        <p:nvPr/>
+      </p:nvGrpSpPr>
+      <p:grpSpPr>
+        <a:xfrm>
+          <a:off x="0" y="0"/>
+          <a:ext cx="0" cy="0"/>
+          <a:chOff x="0" y="0"/>
+          <a:chExt cx="0" cy="0"/>
+        </a:xfrm>
+      </p:grpSpPr>
+      <p:sp>
+        <p:nvSpPr>
+          <p:cNvPr id="2" name="Zástupný symbol pro obrázek snímku 1"/>
+          <p:cNvSpPr>
+            <a:spLocks noGrp="1" noRot="1" noChangeAspect="1"/>
+          </p:cNvSpPr>
+          <p:nvPr>
+            <p:ph type="sldImg"/>
+          </p:nvPr>
+        </p:nvSpPr>
+        <p:spPr/>
+      </p:sp>
+      <p:sp>
+        <p:nvSpPr>
+          <p:cNvPr id="3" name="Zástupný symbol pro poznámky 2"/>
+          <p:cNvSpPr>
+            <a:spLocks noGrp="1"/>
+          </p:cNvSpPr>
+          <p:nvPr>
+            <p:ph type="body" idx="1"/>
+          </p:nvPr>
+        </p:nvSpPr>
+        <p:spPr/>
+        <p:txBody>
+          <a:bodyPr/>
+          <a:lstStyle/>
+          <a:p>
             <a:r>
               <a:rPr lang="cs-CZ" dirty="0"/>
               <a:t>- Logic Apps </a:t>
@@ -753,7 +1359,7 @@
 </p:notes>
 </file>
 
-<file path=ppt/notesSlides/notesSlide3.xml><?xml version="1.0" encoding="utf-8"?>
+<file path=ppt/notesSlides/notesSlide4.xml><?xml version="1.0" encoding="utf-8"?>
 <p:notes xmlns:a="http://schemas.openxmlformats.org/drawingml/2006/main" xmlns:r="http://schemas.openxmlformats.org/officeDocument/2006/relationships" xmlns:p="http://schemas.openxmlformats.org/presentationml/2006/main">
   <p:cSld>
     <p:spTree>
@@ -1210,7 +1816,7 @@
           <a:p>
             <a:fld id="{0DA6F2F8-F70A-47D7-AD2D-4F12E71A0C18}" type="datetimeFigureOut">
               <a:rPr lang="cs-CZ" smtClean="0"/>
-              <a:t>28.03.2023</a:t>
+              <a:t>13.03.2024</a:t>
             </a:fld>
             <a:endParaRPr lang="cs-CZ"/>
           </a:p>
@@ -1391,7 +1997,7 @@
           <a:p>
             <a:fld id="{0DA6F2F8-F70A-47D7-AD2D-4F12E71A0C18}" type="datetimeFigureOut">
               <a:rPr lang="cs-CZ" smtClean="0"/>
-              <a:t>28.03.2023</a:t>
+              <a:t>13.03.2024</a:t>
             </a:fld>
             <a:endParaRPr lang="cs-CZ"/>
           </a:p>
@@ -1582,7 +2188,7 @@
           <a:p>
             <a:fld id="{0DA6F2F8-F70A-47D7-AD2D-4F12E71A0C18}" type="datetimeFigureOut">
               <a:rPr lang="cs-CZ" smtClean="0"/>
-              <a:t>28.03.2023</a:t>
+              <a:t>13.03.2024</a:t>
             </a:fld>
             <a:endParaRPr lang="cs-CZ"/>
           </a:p>
@@ -1797,7 +2403,7 @@
           <a:p>
             <a:fld id="{0DA6F2F8-F70A-47D7-AD2D-4F12E71A0C18}" type="datetimeFigureOut">
               <a:rPr lang="cs-CZ" smtClean="0"/>
-              <a:t>28.03.2023</a:t>
+              <a:t>13.03.2024</a:t>
             </a:fld>
             <a:endParaRPr lang="cs-CZ"/>
           </a:p>
@@ -2072,7 +2678,7 @@
           <a:p>
             <a:fld id="{0DA6F2F8-F70A-47D7-AD2D-4F12E71A0C18}" type="datetimeFigureOut">
               <a:rPr lang="cs-CZ" smtClean="0"/>
-              <a:t>28.03.2023</a:t>
+              <a:t>13.03.2024</a:t>
             </a:fld>
             <a:endParaRPr lang="cs-CZ"/>
           </a:p>
@@ -2389,7 +2995,7 @@
           <a:p>
             <a:fld id="{0DA6F2F8-F70A-47D7-AD2D-4F12E71A0C18}" type="datetimeFigureOut">
               <a:rPr lang="cs-CZ" smtClean="0"/>
-              <a:t>28.03.2023</a:t>
+              <a:t>13.03.2024</a:t>
             </a:fld>
             <a:endParaRPr lang="cs-CZ" dirty="0"/>
           </a:p>
@@ -2839,7 +3445,7 @@
           <a:p>
             <a:fld id="{0DA6F2F8-F70A-47D7-AD2D-4F12E71A0C18}" type="datetimeFigureOut">
               <a:rPr lang="cs-CZ" smtClean="0"/>
-              <a:t>28.03.2023</a:t>
+              <a:t>13.03.2024</a:t>
             </a:fld>
             <a:endParaRPr lang="cs-CZ"/>
           </a:p>
@@ -2986,7 +3592,7 @@
           <a:p>
             <a:fld id="{0DA6F2F8-F70A-47D7-AD2D-4F12E71A0C18}" type="datetimeFigureOut">
               <a:rPr lang="cs-CZ" smtClean="0"/>
-              <a:t>28.03.2023</a:t>
+              <a:t>13.03.2024</a:t>
             </a:fld>
             <a:endParaRPr lang="cs-CZ"/>
           </a:p>
@@ -3093,7 +3699,7 @@
           <a:p>
             <a:fld id="{0DA6F2F8-F70A-47D7-AD2D-4F12E71A0C18}" type="datetimeFigureOut">
               <a:rPr lang="cs-CZ" smtClean="0"/>
-              <a:t>28.03.2023</a:t>
+              <a:t>13.03.2024</a:t>
             </a:fld>
             <a:endParaRPr lang="cs-CZ"/>
           </a:p>
@@ -3384,7 +3990,7 @@
           <a:p>
             <a:fld id="{0DA6F2F8-F70A-47D7-AD2D-4F12E71A0C18}" type="datetimeFigureOut">
               <a:rPr lang="cs-CZ" smtClean="0"/>
-              <a:t>28.03.2023</a:t>
+              <a:t>13.03.2024</a:t>
             </a:fld>
             <a:endParaRPr lang="cs-CZ"/>
           </a:p>
@@ -3653,7 +4259,7 @@
           <a:p>
             <a:fld id="{0DA6F2F8-F70A-47D7-AD2D-4F12E71A0C18}" type="datetimeFigureOut">
               <a:rPr lang="cs-CZ" smtClean="0"/>
-              <a:t>28.03.2023</a:t>
+              <a:t>13.03.2024</a:t>
             </a:fld>
             <a:endParaRPr lang="cs-CZ"/>
           </a:p>
@@ -3917,7 +4523,7 @@
           <a:p>
             <a:fld id="{0DA6F2F8-F70A-47D7-AD2D-4F12E71A0C18}" type="datetimeFigureOut">
               <a:rPr lang="cs-CZ" smtClean="0"/>
-              <a:t>28.03.2023</a:t>
+              <a:t>13.03.2024</a:t>
             </a:fld>
             <a:endParaRPr lang="cs-CZ"/>
           </a:p>
@@ -4975,7 +5581,7 @@
             <a:pPr lvl="1"/>
             <a:r>
               <a:rPr lang="en-US" dirty="0"/>
-              <a:t>0,57€ for next 1 000 000 operations</a:t>
+              <a:t>0,55€ for next 1 000 000 operations</a:t>
             </a:r>
           </a:p>
           <a:p>
@@ -5011,7 +5617,7 @@
             </a:r>
             <a:r>
               <a:rPr lang="en-US" dirty="0"/>
-              <a:t>9€</a:t>
+              <a:t>6€</a:t>
             </a:r>
             <a:r>
               <a:rPr lang="cs-CZ" dirty="0"/>
@@ -5019,7 +5625,7 @@
             </a:r>
             <a:r>
               <a:rPr lang="en-US" dirty="0"/>
-              <a:t>49</a:t>
+              <a:t>22</a:t>
             </a:r>
             <a:r>
               <a:rPr lang="cs-CZ" dirty="0"/>
@@ -5066,7 +5672,7 @@
             <a:pPr lvl="1"/>
             <a:r>
               <a:rPr lang="en-US" dirty="0"/>
-              <a:t>16€ for 1 000 000 GB-s = average monthly memory consumption [GB] * run [s[ (measured in </a:t>
+              <a:t>15€ for 1 000 000 GB-s = average monthly memory consumption [GB] * run [s[ (measured in </a:t>
             </a:r>
             <a:r>
               <a:rPr lang="en-US" dirty="0" err="1"/>
@@ -5220,291 +5826,10 @@
       </p:grpSpPr>
       <p:sp>
         <p:nvSpPr>
-          <p:cNvPr id="2" name="Title 1"/>
-          <p:cNvSpPr>
-            <a:spLocks noGrp="1"/>
-          </p:cNvSpPr>
-          <p:nvPr>
-            <p:ph type="title"/>
-          </p:nvPr>
-        </p:nvSpPr>
-        <p:spPr/>
-        <p:txBody>
-          <a:bodyPr/>
-          <a:lstStyle/>
-          <a:p>
-            <a:r>
-              <a:rPr lang="cs-CZ" dirty="0" err="1"/>
-              <a:t>Serverless</a:t>
-            </a:r>
-            <a:r>
-              <a:rPr lang="cs-CZ" dirty="0"/>
-              <a:t>?</a:t>
-            </a:r>
-          </a:p>
-        </p:txBody>
-      </p:sp>
-      <p:sp>
-        <p:nvSpPr>
-          <p:cNvPr id="3" name="Content Placeholder 2"/>
-          <p:cNvSpPr>
-            <a:spLocks noGrp="1"/>
-          </p:cNvSpPr>
-          <p:nvPr>
-            <p:ph sz="half" idx="1"/>
-          </p:nvPr>
-        </p:nvSpPr>
-        <p:spPr/>
-        <p:txBody>
-          <a:bodyPr>
-            <a:normAutofit fontScale="92500" lnSpcReduction="10000"/>
-          </a:bodyPr>
-          <a:lstStyle/>
-          <a:p>
-            <a:r>
-              <a:rPr lang="en-US" dirty="0"/>
-              <a:t>On-Premises / Data-</a:t>
-            </a:r>
-            <a:r>
-              <a:rPr lang="en-US" dirty="0" err="1"/>
-              <a:t>centr</a:t>
-            </a:r>
-            <a:r>
-              <a:rPr lang="cs-CZ" dirty="0"/>
-              <a:t>e</a:t>
-            </a:r>
-            <a:endParaRPr lang="en-US" dirty="0"/>
-          </a:p>
-          <a:p>
-            <a:pPr lvl="1"/>
-            <a:r>
-              <a:rPr lang="en-US" dirty="0"/>
-              <a:t>Hardwar</a:t>
-            </a:r>
-            <a:r>
-              <a:rPr lang="cs-CZ" dirty="0"/>
-              <a:t>e </a:t>
-            </a:r>
-            <a:r>
-              <a:rPr lang="cs-CZ" dirty="0" err="1"/>
-              <a:t>is</a:t>
-            </a:r>
-            <a:r>
-              <a:rPr lang="cs-CZ" dirty="0"/>
-              <a:t> </a:t>
-            </a:r>
-            <a:r>
-              <a:rPr lang="cs-CZ" dirty="0" err="1"/>
-              <a:t>the</a:t>
-            </a:r>
-            <a:r>
-              <a:rPr lang="cs-CZ" dirty="0"/>
-              <a:t> unit </a:t>
-            </a:r>
-            <a:r>
-              <a:rPr lang="cs-CZ" dirty="0" err="1"/>
-              <a:t>of</a:t>
-            </a:r>
-            <a:r>
-              <a:rPr lang="cs-CZ" dirty="0"/>
-              <a:t> </a:t>
-            </a:r>
-            <a:r>
-              <a:rPr lang="cs-CZ" dirty="0" err="1"/>
-              <a:t>scale</a:t>
-            </a:r>
-            <a:endParaRPr lang="en-US" dirty="0"/>
-          </a:p>
-          <a:p>
-            <a:pPr lvl="1"/>
-            <a:r>
-              <a:rPr lang="en-US" dirty="0"/>
-              <a:t>Abstracts the physical hosting environment</a:t>
-            </a:r>
-          </a:p>
-          <a:p>
-            <a:r>
-              <a:rPr lang="en-US" dirty="0"/>
-              <a:t>IaaS</a:t>
-            </a:r>
-            <a:endParaRPr lang="cs-CZ" dirty="0"/>
-          </a:p>
-          <a:p>
-            <a:pPr lvl="1"/>
-            <a:r>
-              <a:rPr lang="cs-CZ" dirty="0" err="1"/>
-              <a:t>Operating</a:t>
-            </a:r>
-            <a:r>
-              <a:rPr lang="cs-CZ" dirty="0"/>
-              <a:t> </a:t>
-            </a:r>
-            <a:r>
-              <a:rPr lang="en-US" dirty="0"/>
-              <a:t>system</a:t>
-            </a:r>
-            <a:r>
-              <a:rPr lang="cs-CZ" dirty="0"/>
-              <a:t> </a:t>
-            </a:r>
-            <a:r>
-              <a:rPr lang="cs-CZ" dirty="0" err="1"/>
-              <a:t>is</a:t>
-            </a:r>
-            <a:r>
-              <a:rPr lang="cs-CZ" dirty="0"/>
-              <a:t> </a:t>
-            </a:r>
-            <a:r>
-              <a:rPr lang="cs-CZ" dirty="0" err="1"/>
-              <a:t>the</a:t>
-            </a:r>
-            <a:r>
-              <a:rPr lang="cs-CZ" dirty="0"/>
-              <a:t> unit </a:t>
-            </a:r>
-            <a:r>
-              <a:rPr lang="cs-CZ" dirty="0" err="1"/>
-              <a:t>of</a:t>
-            </a:r>
-            <a:r>
-              <a:rPr lang="cs-CZ" dirty="0"/>
-              <a:t> </a:t>
-            </a:r>
-            <a:r>
-              <a:rPr lang="cs-CZ" dirty="0" err="1"/>
-              <a:t>scale</a:t>
-            </a:r>
-            <a:endParaRPr lang="cs-CZ" dirty="0"/>
-          </a:p>
-          <a:p>
-            <a:pPr lvl="1"/>
-            <a:r>
-              <a:rPr lang="cs-CZ" dirty="0" err="1"/>
-              <a:t>Abstracts</a:t>
-            </a:r>
-            <a:r>
-              <a:rPr lang="cs-CZ" dirty="0"/>
-              <a:t> </a:t>
-            </a:r>
-            <a:r>
-              <a:rPr lang="cs-CZ" dirty="0" err="1"/>
-              <a:t>the</a:t>
-            </a:r>
-            <a:r>
-              <a:rPr lang="cs-CZ" dirty="0"/>
-              <a:t> hardware</a:t>
-            </a:r>
-            <a:endParaRPr lang="en-US" dirty="0"/>
-          </a:p>
-          <a:p>
-            <a:r>
-              <a:rPr lang="en-US" dirty="0"/>
-              <a:t>PaaS</a:t>
-            </a:r>
-            <a:endParaRPr lang="cs-CZ" dirty="0"/>
-          </a:p>
-          <a:p>
-            <a:pPr lvl="1"/>
-            <a:r>
-              <a:rPr lang="cs-CZ" dirty="0" err="1"/>
-              <a:t>Application</a:t>
-            </a:r>
-            <a:r>
-              <a:rPr lang="cs-CZ" dirty="0"/>
-              <a:t> </a:t>
-            </a:r>
-            <a:r>
-              <a:rPr lang="cs-CZ" dirty="0" err="1"/>
-              <a:t>is</a:t>
-            </a:r>
-            <a:r>
-              <a:rPr lang="cs-CZ" dirty="0"/>
-              <a:t> </a:t>
-            </a:r>
-            <a:r>
-              <a:rPr lang="cs-CZ" dirty="0" err="1"/>
-              <a:t>the</a:t>
-            </a:r>
-            <a:r>
-              <a:rPr lang="cs-CZ" dirty="0"/>
-              <a:t> unit </a:t>
-            </a:r>
-            <a:r>
-              <a:rPr lang="cs-CZ" dirty="0" err="1"/>
-              <a:t>of</a:t>
-            </a:r>
-            <a:r>
-              <a:rPr lang="cs-CZ" dirty="0"/>
-              <a:t> </a:t>
-            </a:r>
-            <a:r>
-              <a:rPr lang="cs-CZ" dirty="0" err="1"/>
-              <a:t>scale</a:t>
-            </a:r>
-            <a:endParaRPr lang="cs-CZ" dirty="0"/>
-          </a:p>
-          <a:p>
-            <a:pPr lvl="1"/>
-            <a:r>
-              <a:rPr lang="cs-CZ" dirty="0" err="1"/>
-              <a:t>Abstracts</a:t>
-            </a:r>
-            <a:r>
-              <a:rPr lang="cs-CZ" dirty="0"/>
-              <a:t> </a:t>
-            </a:r>
-            <a:r>
-              <a:rPr lang="cs-CZ" dirty="0" err="1"/>
-              <a:t>the</a:t>
-            </a:r>
-            <a:r>
-              <a:rPr lang="cs-CZ" dirty="0"/>
-              <a:t> </a:t>
-            </a:r>
-            <a:r>
-              <a:rPr lang="cs-CZ" dirty="0" err="1"/>
-              <a:t>Operating</a:t>
-            </a:r>
-            <a:r>
-              <a:rPr lang="cs-CZ" dirty="0"/>
-              <a:t> </a:t>
-            </a:r>
-            <a:r>
-              <a:rPr lang="cs-CZ" dirty="0" err="1"/>
-              <a:t>Syst</a:t>
-            </a:r>
-            <a:r>
-              <a:rPr lang="en-US" dirty="0"/>
-              <a:t>e</a:t>
-            </a:r>
-            <a:r>
-              <a:rPr lang="cs-CZ" dirty="0"/>
-              <a:t>m</a:t>
-            </a:r>
-            <a:endParaRPr lang="en-US" dirty="0"/>
-          </a:p>
-          <a:p>
-            <a:r>
-              <a:rPr lang="en-US" dirty="0"/>
-              <a:t>SaaS</a:t>
-            </a:r>
-          </a:p>
-          <a:p>
-            <a:pPr lvl="1"/>
-            <a:r>
-              <a:rPr lang="en-US" dirty="0"/>
-              <a:t>Cloud-hosted application ready-to-use</a:t>
-            </a:r>
-          </a:p>
-        </p:txBody>
-      </p:sp>
-      <p:sp>
-        <p:nvSpPr>
-          <p:cNvPr id="4" name="Content Placeholder 3">
+          <p:cNvPr id="2" name="Nadpis 1">
             <a:extLst>
               <a:ext uri="{FF2B5EF4-FFF2-40B4-BE49-F238E27FC236}">
-                <a16:creationId xmlns:a16="http://schemas.microsoft.com/office/drawing/2014/main" id="{223B5E79-D8CD-7854-5316-B6CCE0F2EEA3}"/>
+                <a16:creationId xmlns:a16="http://schemas.microsoft.com/office/drawing/2014/main" id="{B62F6F5F-6217-4EF8-BE39-8706E45C57D0}"/>
               </a:ext>
             </a:extLst>
           </p:cNvPr>
@@ -5512,7 +5837,7 @@
             <a:spLocks noGrp="1"/>
           </p:cNvSpPr>
           <p:nvPr>
-            <p:ph sz="half" idx="2"/>
+            <p:ph type="title"/>
           </p:nvPr>
         </p:nvSpPr>
         <p:spPr/>
@@ -5521,16 +5846,114 @@
           <a:lstStyle/>
           <a:p>
             <a:r>
-              <a:rPr lang="en-US" dirty="0"/>
+              <a:rPr lang="cs-CZ" dirty="0" err="1"/>
+              <a:t>What</a:t>
+            </a:r>
+            <a:r>
+              <a:rPr lang="cs-CZ" dirty="0"/>
+              <a:t> </a:t>
+            </a:r>
+            <a:r>
+              <a:rPr lang="cs-CZ" dirty="0" err="1"/>
+              <a:t>is</a:t>
+            </a:r>
+            <a:r>
+              <a:rPr lang="cs-CZ" dirty="0"/>
+              <a:t> </a:t>
+            </a:r>
+            <a:r>
+              <a:rPr lang="cs-CZ" dirty="0" err="1"/>
               <a:t>Serverless</a:t>
             </a:r>
+            <a:r>
+              <a:rPr lang="cs-CZ" dirty="0"/>
+              <a:t>?</a:t>
+            </a:r>
+            <a:endParaRPr lang="en-US" dirty="0"/>
+          </a:p>
+        </p:txBody>
+      </p:sp>
+      <p:sp>
+        <p:nvSpPr>
+          <p:cNvPr id="3" name="Zástupný obsah 2">
+            <a:extLst>
+              <a:ext uri="{FF2B5EF4-FFF2-40B4-BE49-F238E27FC236}">
+                <a16:creationId xmlns:a16="http://schemas.microsoft.com/office/drawing/2014/main" id="{557C2F28-B719-40F2-9E59-CA35AA01043C}"/>
+              </a:ext>
+            </a:extLst>
+          </p:cNvPr>
+          <p:cNvSpPr>
+            <a:spLocks noGrp="1"/>
+          </p:cNvSpPr>
+          <p:nvPr>
+            <p:ph idx="1"/>
+          </p:nvPr>
+        </p:nvSpPr>
+        <p:spPr/>
+        <p:txBody>
+          <a:bodyPr/>
+          <a:lstStyle/>
+          <a:p>
+            <a:r>
+              <a:rPr lang="cs-CZ" dirty="0" err="1"/>
+              <a:t>Abstraction</a:t>
+            </a:r>
+            <a:r>
+              <a:rPr lang="cs-CZ" dirty="0"/>
+              <a:t> </a:t>
+            </a:r>
+            <a:r>
+              <a:rPr lang="cs-CZ" dirty="0" err="1"/>
+              <a:t>of</a:t>
+            </a:r>
+            <a:r>
+              <a:rPr lang="cs-CZ" dirty="0"/>
+              <a:t> </a:t>
+            </a:r>
+            <a:r>
+              <a:rPr lang="cs-CZ" dirty="0" err="1"/>
+              <a:t>Servers</a:t>
+            </a:r>
             <a:endParaRPr lang="cs-CZ" dirty="0"/>
           </a:p>
           <a:p>
-            <a:pPr lvl="1"/>
-            <a:r>
-              <a:rPr lang="cs-CZ" dirty="0" err="1"/>
-              <a:t>Function</a:t>
+            <a:r>
+              <a:rPr lang="cs-CZ" dirty="0"/>
+              <a:t>Event-</a:t>
+            </a:r>
+            <a:r>
+              <a:rPr lang="cs-CZ" dirty="0" err="1"/>
+              <a:t>driven</a:t>
+            </a:r>
+            <a:r>
+              <a:rPr lang="cs-CZ" dirty="0"/>
+              <a:t> instant </a:t>
+            </a:r>
+            <a:r>
+              <a:rPr lang="cs-CZ" dirty="0" err="1"/>
+              <a:t>scale</a:t>
+            </a:r>
+            <a:endParaRPr lang="cs-CZ" dirty="0"/>
+          </a:p>
+          <a:p>
+            <a:r>
+              <a:rPr lang="cs-CZ" dirty="0" err="1"/>
+              <a:t>Microservices</a:t>
+            </a:r>
+            <a:r>
+              <a:rPr lang="cs-CZ" dirty="0"/>
+              <a:t> -&gt; </a:t>
+            </a:r>
+            <a:r>
+              <a:rPr lang="cs-CZ" dirty="0" err="1"/>
+              <a:t>Nanoservices</a:t>
+            </a:r>
+            <a:endParaRPr lang="cs-CZ" dirty="0"/>
+          </a:p>
+          <a:p>
+            <a:r>
+              <a:rPr lang="cs-CZ" dirty="0" err="1"/>
+              <a:t>Stateless</a:t>
             </a:r>
             <a:r>
               <a:rPr lang="cs-CZ" dirty="0"/>
@@ -5538,71 +5961,23 @@
             </a:r>
             <a:r>
               <a:rPr lang="cs-CZ" dirty="0" err="1"/>
-              <a:t>is</a:t>
-            </a:r>
-            <a:r>
-              <a:rPr lang="cs-CZ" dirty="0"/>
-              <a:t> </a:t>
-            </a:r>
-            <a:r>
-              <a:rPr lang="cs-CZ" dirty="0" err="1"/>
-              <a:t>the</a:t>
-            </a:r>
-            <a:r>
-              <a:rPr lang="cs-CZ" dirty="0"/>
-              <a:t> unit </a:t>
-            </a:r>
-            <a:r>
-              <a:rPr lang="cs-CZ" dirty="0" err="1"/>
-              <a:t>of</a:t>
-            </a:r>
-            <a:r>
-              <a:rPr lang="cs-CZ" dirty="0"/>
-              <a:t> </a:t>
-            </a:r>
-            <a:r>
-              <a:rPr lang="cs-CZ" dirty="0" err="1"/>
-              <a:t>scale</a:t>
+              <a:t>functions</a:t>
             </a:r>
             <a:endParaRPr lang="cs-CZ" dirty="0"/>
           </a:p>
           <a:p>
-            <a:pPr lvl="1"/>
-            <a:r>
-              <a:rPr lang="cs-CZ" dirty="0" err="1"/>
-              <a:t>Abstracts</a:t>
-            </a:r>
-            <a:r>
-              <a:rPr lang="cs-CZ" dirty="0"/>
-              <a:t> </a:t>
-            </a:r>
-            <a:r>
-              <a:rPr lang="cs-CZ" dirty="0" err="1"/>
-              <a:t>the</a:t>
-            </a:r>
-            <a:r>
-              <a:rPr lang="cs-CZ" dirty="0"/>
-              <a:t> </a:t>
-            </a:r>
-            <a:r>
-              <a:rPr lang="cs-CZ" dirty="0" err="1"/>
-              <a:t>language</a:t>
-            </a:r>
-            <a:r>
-              <a:rPr lang="cs-CZ" dirty="0"/>
-              <a:t> runtime</a:t>
+            <a:r>
+              <a:rPr lang="cs-CZ" dirty="0" err="1"/>
+              <a:t>Micro-Billing</a:t>
             </a:r>
             <a:endParaRPr lang="en-US" dirty="0"/>
-          </a:p>
-          <a:p>
-            <a:endParaRPr lang="cs-CZ" dirty="0"/>
           </a:p>
         </p:txBody>
       </p:sp>
     </p:spTree>
     <p:extLst>
       <p:ext uri="{BB962C8B-B14F-4D97-AF65-F5344CB8AC3E}">
-        <p14:creationId xmlns:p14="http://schemas.microsoft.com/office/powerpoint/2010/main" val="2960010662"/>
+        <p14:creationId xmlns:p14="http://schemas.microsoft.com/office/powerpoint/2010/main" val="1037749636"/>
       </p:ext>
     </p:extLst>
   </p:cSld>
@@ -5646,7 +6021,7 @@
           <p:cNvPr id="2" name="Nadpis 1">
             <a:extLst>
               <a:ext uri="{FF2B5EF4-FFF2-40B4-BE49-F238E27FC236}">
-                <a16:creationId xmlns:a16="http://schemas.microsoft.com/office/drawing/2014/main" id="{B62F6F5F-6217-4EF8-BE39-8706E45C57D0}"/>
+                <a16:creationId xmlns:a16="http://schemas.microsoft.com/office/drawing/2014/main" id="{31E443C1-C16A-19D1-9DCF-39AA86C19921}"/>
               </a:ext>
             </a:extLst>
           </p:cNvPr>
@@ -5663,138 +6038,46 @@
           <a:lstStyle/>
           <a:p>
             <a:r>
-              <a:rPr lang="cs-CZ" dirty="0" err="1"/>
-              <a:t>What</a:t>
-            </a:r>
-            <a:r>
-              <a:rPr lang="cs-CZ" dirty="0"/>
-              <a:t> </a:t>
-            </a:r>
-            <a:r>
-              <a:rPr lang="cs-CZ" dirty="0" err="1"/>
-              <a:t>is</a:t>
-            </a:r>
-            <a:r>
-              <a:rPr lang="cs-CZ" dirty="0"/>
-              <a:t> </a:t>
-            </a:r>
-            <a:r>
-              <a:rPr lang="cs-CZ" dirty="0" err="1"/>
-              <a:t>Serverless</a:t>
-            </a:r>
-            <a:r>
-              <a:rPr lang="cs-CZ" dirty="0"/>
-              <a:t>?</a:t>
-            </a:r>
-            <a:endParaRPr lang="en-US" dirty="0"/>
-          </a:p>
-        </p:txBody>
-      </p:sp>
-      <p:sp>
-        <p:nvSpPr>
-          <p:cNvPr id="3" name="Zástupný obsah 2">
+              <a:rPr lang="en-US" dirty="0"/>
+              <a:t>Hosting models</a:t>
+            </a:r>
+            <a:endParaRPr lang="cs-CZ" dirty="0"/>
+          </a:p>
+        </p:txBody>
+      </p:sp>
+      <p:pic>
+        <p:nvPicPr>
+          <p:cNvPr id="6" name="Zástupný obsah 5">
             <a:extLst>
               <a:ext uri="{FF2B5EF4-FFF2-40B4-BE49-F238E27FC236}">
-                <a16:creationId xmlns:a16="http://schemas.microsoft.com/office/drawing/2014/main" id="{557C2F28-B719-40F2-9E59-CA35AA01043C}"/>
+                <a16:creationId xmlns:a16="http://schemas.microsoft.com/office/drawing/2014/main" id="{51FC4949-9A0A-7B69-A806-6442F7FB61D4}"/>
               </a:ext>
             </a:extLst>
           </p:cNvPr>
-          <p:cNvSpPr>
-            <a:spLocks noGrp="1"/>
-          </p:cNvSpPr>
+          <p:cNvPicPr>
+            <a:picLocks noGrp="1" noChangeAspect="1"/>
+          </p:cNvPicPr>
           <p:nvPr>
             <p:ph idx="1"/>
           </p:nvPr>
-        </p:nvSpPr>
-        <p:spPr/>
-        <p:txBody>
-          <a:bodyPr/>
-          <a:lstStyle/>
-          <a:p>
-            <a:r>
-              <a:rPr lang="cs-CZ" dirty="0" err="1"/>
-              <a:t>Abstraction</a:t>
-            </a:r>
-            <a:r>
-              <a:rPr lang="cs-CZ" dirty="0"/>
-              <a:t> </a:t>
-            </a:r>
-            <a:r>
-              <a:rPr lang="cs-CZ" dirty="0" err="1"/>
-              <a:t>of</a:t>
-            </a:r>
-            <a:r>
-              <a:rPr lang="cs-CZ" dirty="0"/>
-              <a:t> </a:t>
-            </a:r>
-            <a:r>
-              <a:rPr lang="cs-CZ" dirty="0" err="1"/>
-              <a:t>Servers</a:t>
-            </a:r>
-            <a:endParaRPr lang="cs-CZ" dirty="0"/>
-          </a:p>
-          <a:p>
-            <a:r>
-              <a:rPr lang="cs-CZ" dirty="0"/>
-              <a:t>Event-</a:t>
-            </a:r>
-            <a:r>
-              <a:rPr lang="cs-CZ" dirty="0" err="1"/>
-              <a:t>driven</a:t>
-            </a:r>
-            <a:r>
-              <a:rPr lang="cs-CZ" dirty="0"/>
-              <a:t> instant </a:t>
-            </a:r>
-            <a:r>
-              <a:rPr lang="cs-CZ" dirty="0" err="1"/>
-              <a:t>scale</a:t>
-            </a:r>
-            <a:endParaRPr lang="cs-CZ" dirty="0"/>
-          </a:p>
-          <a:p>
-            <a:r>
-              <a:rPr lang="cs-CZ" dirty="0" err="1"/>
-              <a:t>Microservices</a:t>
-            </a:r>
-            <a:r>
-              <a:rPr lang="cs-CZ" dirty="0"/>
-              <a:t> -&gt; </a:t>
-            </a:r>
-            <a:r>
-              <a:rPr lang="cs-CZ" dirty="0" err="1"/>
-              <a:t>Nanoservices</a:t>
-            </a:r>
-            <a:endParaRPr lang="cs-CZ" dirty="0"/>
-          </a:p>
-          <a:p>
-            <a:r>
-              <a:rPr lang="cs-CZ" dirty="0" err="1"/>
-              <a:t>Stateless</a:t>
-            </a:r>
-            <a:r>
-              <a:rPr lang="cs-CZ" dirty="0"/>
-              <a:t> </a:t>
-            </a:r>
-            <a:r>
-              <a:rPr lang="cs-CZ" dirty="0" err="1"/>
-              <a:t>functions</a:t>
-            </a:r>
-            <a:endParaRPr lang="cs-CZ" dirty="0"/>
-          </a:p>
-          <a:p>
-            <a:r>
-              <a:rPr lang="cs-CZ" dirty="0" err="1"/>
-              <a:t>Micro-Billing</a:t>
-            </a:r>
-            <a:endParaRPr lang="en-US" dirty="0"/>
-          </a:p>
-        </p:txBody>
-      </p:sp>
+        </p:nvPicPr>
+        <p:blipFill>
+          <a:blip r:embed="rId3"/>
+          <a:stretch>
+            <a:fillRect/>
+          </a:stretch>
+        </p:blipFill>
+        <p:spPr>
+          <a:xfrm>
+            <a:off x="1332835" y="1767389"/>
+            <a:ext cx="9526329" cy="4191585"/>
+          </a:xfrm>
+        </p:spPr>
+      </p:pic>
     </p:spTree>
     <p:extLst>
       <p:ext uri="{BB962C8B-B14F-4D97-AF65-F5344CB8AC3E}">
-        <p14:creationId xmlns:p14="http://schemas.microsoft.com/office/powerpoint/2010/main" val="1037749636"/>
+        <p14:creationId xmlns:p14="http://schemas.microsoft.com/office/powerpoint/2010/main" val="3671823313"/>
       </p:ext>
     </p:extLst>
   </p:cSld>
@@ -7392,7 +7675,7 @@
           <p:nvPr/>
         </p:nvPicPr>
         <p:blipFill>
-          <a:blip r:embed="rId2"/>
+          <a:blip r:embed="rId3"/>
           <a:stretch>
             <a:fillRect/>
           </a:stretch>

</xml_diff>

<commit_message>
Lab 7 - Serverless update
</commit_message>
<xml_diff>
--- a/Lab7-Serverless/Serverless-computing.pptx
+++ b/Lab7-Serverless/Serverless-computing.pptx
@@ -252,7 +252,7 @@
             <a:fld id="{A74C3DD1-6B4C-423E-A696-BD4124EC33BC}" type="datetimeFigureOut">
               <a:rPr lang="cs-CZ" smtClean="0"/>
               <a:pPr/>
-              <a:t>13.03.2024</a:t>
+              <a:t>13.03.2025</a:t>
             </a:fld>
             <a:endParaRPr lang="cs-CZ" dirty="0"/>
           </a:p>
@@ -1403,6 +1403,91 @@
           <a:bodyPr/>
           <a:lstStyle/>
           <a:p>
+            <a:endParaRPr lang="cs-CZ" dirty="0"/>
+          </a:p>
+        </p:txBody>
+      </p:sp>
+      <p:sp>
+        <p:nvSpPr>
+          <p:cNvPr id="4" name="Zástupný symbol pro číslo snímku 3"/>
+          <p:cNvSpPr>
+            <a:spLocks noGrp="1"/>
+          </p:cNvSpPr>
+          <p:nvPr>
+            <p:ph type="sldNum" sz="quarter" idx="5"/>
+          </p:nvPr>
+        </p:nvSpPr>
+        <p:spPr/>
+        <p:txBody>
+          <a:bodyPr/>
+          <a:lstStyle/>
+          <a:p>
+            <a:fld id="{A16764F6-20DF-4459-862B-64827B1A3974}" type="slidenum">
+              <a:rPr lang="cs-CZ" smtClean="0"/>
+              <a:pPr/>
+              <a:t>13</a:t>
+            </a:fld>
+            <a:endParaRPr lang="cs-CZ" dirty="0"/>
+          </a:p>
+        </p:txBody>
+      </p:sp>
+    </p:spTree>
+    <p:extLst>
+      <p:ext uri="{BB962C8B-B14F-4D97-AF65-F5344CB8AC3E}">
+        <p14:creationId xmlns:p14="http://schemas.microsoft.com/office/powerpoint/2010/main" val="1504902510"/>
+      </p:ext>
+    </p:extLst>
+  </p:cSld>
+  <p:clrMapOvr>
+    <a:masterClrMapping/>
+  </p:clrMapOvr>
+</p:notes>
+</file>
+
+<file path=ppt/notesSlides/notesSlide5.xml><?xml version="1.0" encoding="utf-8"?>
+<p:notes xmlns:a="http://schemas.openxmlformats.org/drawingml/2006/main" xmlns:r="http://schemas.openxmlformats.org/officeDocument/2006/relationships" xmlns:p="http://schemas.openxmlformats.org/presentationml/2006/main">
+  <p:cSld>
+    <p:spTree>
+      <p:nvGrpSpPr>
+        <p:cNvPr id="1" name=""/>
+        <p:cNvGrpSpPr/>
+        <p:nvPr/>
+      </p:nvGrpSpPr>
+      <p:grpSpPr>
+        <a:xfrm>
+          <a:off x="0" y="0"/>
+          <a:ext cx="0" cy="0"/>
+          <a:chOff x="0" y="0"/>
+          <a:chExt cx="0" cy="0"/>
+        </a:xfrm>
+      </p:grpSpPr>
+      <p:sp>
+        <p:nvSpPr>
+          <p:cNvPr id="2" name="Zástupný symbol pro obrázek snímku 1"/>
+          <p:cNvSpPr>
+            <a:spLocks noGrp="1" noRot="1" noChangeAspect="1"/>
+          </p:cNvSpPr>
+          <p:nvPr>
+            <p:ph type="sldImg"/>
+          </p:nvPr>
+        </p:nvSpPr>
+        <p:spPr/>
+      </p:sp>
+      <p:sp>
+        <p:nvSpPr>
+          <p:cNvPr id="3" name="Zástupný symbol pro poznámky 2"/>
+          <p:cNvSpPr>
+            <a:spLocks noGrp="1"/>
+          </p:cNvSpPr>
+          <p:nvPr>
+            <p:ph type="body" idx="1"/>
+          </p:nvPr>
+        </p:nvSpPr>
+        <p:spPr/>
+        <p:txBody>
+          <a:bodyPr/>
+          <a:lstStyle/>
+          <a:p>
             <a:pPr marL="171450" indent="-171450">
               <a:buFontTx/>
               <a:buChar char="-"/>
@@ -1816,7 +1901,7 @@
           <a:p>
             <a:fld id="{0DA6F2F8-F70A-47D7-AD2D-4F12E71A0C18}" type="datetimeFigureOut">
               <a:rPr lang="cs-CZ" smtClean="0"/>
-              <a:t>13.03.2024</a:t>
+              <a:t>13.03.2025</a:t>
             </a:fld>
             <a:endParaRPr lang="cs-CZ"/>
           </a:p>
@@ -1997,7 +2082,7 @@
           <a:p>
             <a:fld id="{0DA6F2F8-F70A-47D7-AD2D-4F12E71A0C18}" type="datetimeFigureOut">
               <a:rPr lang="cs-CZ" smtClean="0"/>
-              <a:t>13.03.2024</a:t>
+              <a:t>13.03.2025</a:t>
             </a:fld>
             <a:endParaRPr lang="cs-CZ"/>
           </a:p>
@@ -2188,7 +2273,7 @@
           <a:p>
             <a:fld id="{0DA6F2F8-F70A-47D7-AD2D-4F12E71A0C18}" type="datetimeFigureOut">
               <a:rPr lang="cs-CZ" smtClean="0"/>
-              <a:t>13.03.2024</a:t>
+              <a:t>13.03.2025</a:t>
             </a:fld>
             <a:endParaRPr lang="cs-CZ"/>
           </a:p>
@@ -2403,7 +2488,7 @@
           <a:p>
             <a:fld id="{0DA6F2F8-F70A-47D7-AD2D-4F12E71A0C18}" type="datetimeFigureOut">
               <a:rPr lang="cs-CZ" smtClean="0"/>
-              <a:t>13.03.2024</a:t>
+              <a:t>13.03.2025</a:t>
             </a:fld>
             <a:endParaRPr lang="cs-CZ"/>
           </a:p>
@@ -2678,7 +2763,7 @@
           <a:p>
             <a:fld id="{0DA6F2F8-F70A-47D7-AD2D-4F12E71A0C18}" type="datetimeFigureOut">
               <a:rPr lang="cs-CZ" smtClean="0"/>
-              <a:t>13.03.2024</a:t>
+              <a:t>13.03.2025</a:t>
             </a:fld>
             <a:endParaRPr lang="cs-CZ"/>
           </a:p>
@@ -2995,7 +3080,7 @@
           <a:p>
             <a:fld id="{0DA6F2F8-F70A-47D7-AD2D-4F12E71A0C18}" type="datetimeFigureOut">
               <a:rPr lang="cs-CZ" smtClean="0"/>
-              <a:t>13.03.2024</a:t>
+              <a:t>13.03.2025</a:t>
             </a:fld>
             <a:endParaRPr lang="cs-CZ" dirty="0"/>
           </a:p>
@@ -3445,7 +3530,7 @@
           <a:p>
             <a:fld id="{0DA6F2F8-F70A-47D7-AD2D-4F12E71A0C18}" type="datetimeFigureOut">
               <a:rPr lang="cs-CZ" smtClean="0"/>
-              <a:t>13.03.2024</a:t>
+              <a:t>13.03.2025</a:t>
             </a:fld>
             <a:endParaRPr lang="cs-CZ"/>
           </a:p>
@@ -3592,7 +3677,7 @@
           <a:p>
             <a:fld id="{0DA6F2F8-F70A-47D7-AD2D-4F12E71A0C18}" type="datetimeFigureOut">
               <a:rPr lang="cs-CZ" smtClean="0"/>
-              <a:t>13.03.2024</a:t>
+              <a:t>13.03.2025</a:t>
             </a:fld>
             <a:endParaRPr lang="cs-CZ"/>
           </a:p>
@@ -3699,7 +3784,7 @@
           <a:p>
             <a:fld id="{0DA6F2F8-F70A-47D7-AD2D-4F12E71A0C18}" type="datetimeFigureOut">
               <a:rPr lang="cs-CZ" smtClean="0"/>
-              <a:t>13.03.2024</a:t>
+              <a:t>13.03.2025</a:t>
             </a:fld>
             <a:endParaRPr lang="cs-CZ"/>
           </a:p>
@@ -3990,7 +4075,7 @@
           <a:p>
             <a:fld id="{0DA6F2F8-F70A-47D7-AD2D-4F12E71A0C18}" type="datetimeFigureOut">
               <a:rPr lang="cs-CZ" smtClean="0"/>
-              <a:t>13.03.2024</a:t>
+              <a:t>13.03.2025</a:t>
             </a:fld>
             <a:endParaRPr lang="cs-CZ"/>
           </a:p>
@@ -4259,7 +4344,7 @@
           <a:p>
             <a:fld id="{0DA6F2F8-F70A-47D7-AD2D-4F12E71A0C18}" type="datetimeFigureOut">
               <a:rPr lang="cs-CZ" smtClean="0"/>
-              <a:t>13.03.2024</a:t>
+              <a:t>13.03.2025</a:t>
             </a:fld>
             <a:endParaRPr lang="cs-CZ"/>
           </a:p>
@@ -4523,7 +4608,7 @@
           <a:p>
             <a:fld id="{0DA6F2F8-F70A-47D7-AD2D-4F12E71A0C18}" type="datetimeFigureOut">
               <a:rPr lang="cs-CZ" smtClean="0"/>
-              <a:t>13.03.2024</a:t>
+              <a:t>13.03.2025</a:t>
             </a:fld>
             <a:endParaRPr lang="cs-CZ"/>
           </a:p>
@@ -4973,7 +5058,7 @@
           <a:p>
             <a:r>
               <a:rPr lang="en-US" sz="2000" dirty="0"/>
-              <a:t>Software engineer, HAVIT, </a:t>
+              <a:t>Software architect, HAVIT, </a:t>
             </a:r>
             <a:r>
               <a:rPr lang="en-US" sz="2000" dirty="0" err="1"/>
@@ -5244,106 +5329,66 @@
         </p:nvSpPr>
         <p:spPr/>
         <p:txBody>
-          <a:bodyPr/>
+          <a:bodyPr>
+            <a:normAutofit/>
+          </a:bodyPr>
           <a:lstStyle/>
           <a:p>
             <a:r>
-              <a:rPr lang="cs-CZ" dirty="0" err="1"/>
-              <a:t>Should</a:t>
-            </a:r>
-            <a:r>
-              <a:rPr lang="cs-CZ" dirty="0"/>
-              <a:t> </a:t>
-            </a:r>
-            <a:r>
-              <a:rPr lang="cs-CZ" dirty="0" err="1"/>
-              <a:t>be</a:t>
-            </a:r>
-            <a:r>
-              <a:rPr lang="cs-CZ" dirty="0"/>
-              <a:t> </a:t>
-            </a:r>
-            <a:r>
-              <a:rPr lang="cs-CZ" dirty="0" err="1"/>
-              <a:t>stateless</a:t>
-            </a:r>
-            <a:r>
-              <a:rPr lang="cs-CZ" dirty="0"/>
-              <a:t> (not </a:t>
-            </a:r>
-            <a:r>
-              <a:rPr lang="cs-CZ" dirty="0" err="1"/>
-              <a:t>fully</a:t>
-            </a:r>
-            <a:r>
-              <a:rPr lang="cs-CZ" dirty="0"/>
-              <a:t> </a:t>
-            </a:r>
-            <a:r>
-              <a:rPr lang="cs-CZ" dirty="0" err="1"/>
-              <a:t>true</a:t>
-            </a:r>
-            <a:r>
-              <a:rPr lang="cs-CZ" dirty="0"/>
-              <a:t> -&gt; </a:t>
-            </a:r>
-            <a:r>
-              <a:rPr lang="cs-CZ" dirty="0" err="1"/>
-              <a:t>orchestrators</a:t>
-            </a:r>
-            <a:r>
-              <a:rPr lang="cs-CZ" dirty="0"/>
-              <a:t>)</a:t>
-            </a:r>
-          </a:p>
-          <a:p>
-            <a:r>
-              <a:rPr lang="cs-CZ" dirty="0" err="1"/>
-              <a:t>Short-running</a:t>
+              <a:rPr lang="en-US" dirty="0"/>
+              <a:t>Event-Driven </a:t>
+            </a:r>
+          </a:p>
+          <a:p>
+            <a:r>
+              <a:rPr lang="en-US" dirty="0"/>
+              <a:t>Scalable</a:t>
+            </a:r>
+          </a:p>
+          <a:p>
+            <a:r>
+              <a:rPr lang="en-US" dirty="0"/>
+              <a:t>Pay-per-use</a:t>
+            </a:r>
+          </a:p>
+          <a:p>
+            <a:r>
+              <a:rPr lang="en-US" dirty="0"/>
+              <a:t>Multiple languages supported</a:t>
+            </a:r>
+          </a:p>
+          <a:p>
+            <a:r>
+              <a:rPr lang="en-US" dirty="0"/>
+              <a:t>Quick deployment</a:t>
+            </a:r>
+          </a:p>
+          <a:p>
+            <a:r>
+              <a:rPr lang="en-US" dirty="0"/>
+              <a:t>S</a:t>
+            </a:r>
+            <a:r>
+              <a:rPr lang="cs-CZ" dirty="0" err="1"/>
+              <a:t>tateless</a:t>
+            </a:r>
+            <a:r>
+              <a:rPr lang="en-US" dirty="0"/>
+              <a:t> by default (+ durable functions)</a:t>
+            </a:r>
+          </a:p>
+          <a:p>
+            <a:r>
+              <a:rPr lang="en-US" dirty="0"/>
+              <a:t>Integrations with other Azure services</a:t>
+            </a:r>
+          </a:p>
+          <a:p>
+            <a:r>
+              <a:rPr lang="en-US" dirty="0"/>
+              <a:t>Built-in monitoring</a:t>
             </a:r>
             <a:endParaRPr lang="cs-CZ" dirty="0"/>
-          </a:p>
-          <a:p>
-            <a:r>
-              <a:rPr lang="cs-CZ" dirty="0" err="1"/>
-              <a:t>Can</a:t>
-            </a:r>
-            <a:r>
-              <a:rPr lang="cs-CZ" dirty="0"/>
-              <a:t> run in </a:t>
-            </a:r>
-            <a:r>
-              <a:rPr lang="cs-CZ" dirty="0" err="1"/>
-              <a:t>App-Service</a:t>
-            </a:r>
-            <a:r>
-              <a:rPr lang="cs-CZ" dirty="0"/>
-              <a:t> </a:t>
-            </a:r>
-            <a:r>
-              <a:rPr lang="cs-CZ" dirty="0" err="1"/>
-              <a:t>or</a:t>
-            </a:r>
-            <a:r>
-              <a:rPr lang="cs-CZ" dirty="0"/>
-              <a:t> by </a:t>
-            </a:r>
-            <a:r>
-              <a:rPr lang="cs-CZ" dirty="0" err="1"/>
-              <a:t>consumption</a:t>
-            </a:r>
-            <a:r>
-              <a:rPr lang="cs-CZ" dirty="0"/>
-              <a:t> </a:t>
-            </a:r>
-            <a:r>
-              <a:rPr lang="cs-CZ" dirty="0" err="1"/>
-              <a:t>plan</a:t>
-            </a:r>
-            <a:endParaRPr lang="cs-CZ" dirty="0"/>
-          </a:p>
-          <a:p>
-            <a:endParaRPr lang="en-US" dirty="0"/>
           </a:p>
         </p:txBody>
       </p:sp>
@@ -5420,10 +5465,10 @@
       </p:sp>
       <p:pic>
         <p:nvPicPr>
-          <p:cNvPr id="4" name="Zástupný obsah 3">
+          <p:cNvPr id="9" name="Zástupný obsah 8">
             <a:extLst>
               <a:ext uri="{FF2B5EF4-FFF2-40B4-BE49-F238E27FC236}">
-                <a16:creationId xmlns:a16="http://schemas.microsoft.com/office/drawing/2014/main" id="{C560035D-CDF7-4EEB-8620-75046AACD2FB}"/>
+                <a16:creationId xmlns:a16="http://schemas.microsoft.com/office/drawing/2014/main" id="{E2C0078B-14E2-9C0E-D4C8-118AB22315C5}"/>
               </a:ext>
             </a:extLst>
           </p:cNvPr>
@@ -5442,12 +5487,9 @@
         </p:blipFill>
         <p:spPr>
           <a:xfrm>
-            <a:off x="1561467" y="1981731"/>
-            <a:ext cx="9069066" cy="3762900"/>
+            <a:off x="2567608" y="1259570"/>
+            <a:ext cx="7214757" cy="5323792"/>
           </a:xfrm>
-          <a:prstGeom prst="rect">
-            <a:avLst/>
-          </a:prstGeom>
         </p:spPr>
       </p:pic>
     </p:spTree>
@@ -5559,11 +5601,14 @@
           <a:p>
             <a:r>
               <a:rPr lang="en-US" dirty="0">
-                <a:hlinkClick r:id="rId2"/>
+                <a:hlinkClick r:id="rId3"/>
               </a:rPr>
               <a:t>Event Grid</a:t>
             </a:r>
-            <a:endParaRPr lang="en-US" dirty="0"/>
+            <a:r>
+              <a:rPr lang="en-US" dirty="0"/>
+              <a:t> (basic tier)</a:t>
+            </a:r>
           </a:p>
           <a:p>
             <a:pPr lvl="1"/>
@@ -5581,75 +5626,7 @@
             <a:pPr lvl="1"/>
             <a:r>
               <a:rPr lang="en-US" dirty="0"/>
-              <a:t>0,55€ for next 1 000 000 operations</a:t>
-            </a:r>
-          </a:p>
-          <a:p>
-            <a:r>
-              <a:rPr lang="en-US" dirty="0">
-                <a:hlinkClick r:id="rId3"/>
-              </a:rPr>
-              <a:t>Logic Apps</a:t>
-            </a:r>
-            <a:endParaRPr lang="en-US" dirty="0"/>
-          </a:p>
-          <a:p>
-            <a:pPr lvl="1"/>
-            <a:r>
-              <a:rPr lang="en-US" dirty="0"/>
-              <a:t>24€ for 1 000 000 actions</a:t>
-            </a:r>
-            <a:r>
-              <a:rPr lang="cs-CZ" dirty="0"/>
-              <a:t> (4 000 free)</a:t>
-            </a:r>
-            <a:endParaRPr lang="en-US" dirty="0"/>
-          </a:p>
-          <a:p>
-            <a:pPr lvl="1"/>
-            <a:r>
-              <a:rPr lang="en-US" dirty="0"/>
-              <a:t>1</a:t>
-            </a:r>
-            <a:r>
-              <a:rPr lang="cs-CZ" dirty="0"/>
-              <a:t>1</a:t>
-            </a:r>
-            <a:r>
-              <a:rPr lang="en-US" dirty="0"/>
-              <a:t>6€</a:t>
-            </a:r>
-            <a:r>
-              <a:rPr lang="cs-CZ" dirty="0"/>
-              <a:t> (9</a:t>
-            </a:r>
-            <a:r>
-              <a:rPr lang="en-US" dirty="0"/>
-              <a:t>22</a:t>
-            </a:r>
-            <a:r>
-              <a:rPr lang="cs-CZ" dirty="0"/>
-              <a:t>€)</a:t>
-            </a:r>
-            <a:r>
-              <a:rPr lang="en-US" dirty="0"/>
-              <a:t> for 1 000 000 runs of standard</a:t>
-            </a:r>
-            <a:r>
-              <a:rPr lang="cs-CZ" dirty="0"/>
-              <a:t> (</a:t>
-            </a:r>
-            <a:r>
-              <a:rPr lang="cs-CZ" dirty="0" err="1"/>
-              <a:t>enterprise</a:t>
-            </a:r>
-            <a:r>
-              <a:rPr lang="cs-CZ" dirty="0"/>
-              <a:t>)</a:t>
-            </a:r>
-            <a:r>
-              <a:rPr lang="en-US" dirty="0"/>
-              <a:t> connectors</a:t>
+              <a:t>0,572€ for next 1 000 000 operations</a:t>
             </a:r>
           </a:p>
           <a:p>
@@ -5657,9 +5634,83 @@
               <a:rPr lang="en-US" dirty="0">
                 <a:hlinkClick r:id="rId4"/>
               </a:rPr>
+              <a:t>Logic Apps</a:t>
+            </a:r>
+            <a:r>
+              <a:rPr lang="en-US" dirty="0"/>
+              <a:t> (consumption)</a:t>
+            </a:r>
+          </a:p>
+          <a:p>
+            <a:pPr lvl="1"/>
+            <a:r>
+              <a:rPr lang="en-US" dirty="0"/>
+              <a:t>24€ for 1 000 000 actions</a:t>
+            </a:r>
+            <a:r>
+              <a:rPr lang="cs-CZ" dirty="0"/>
+              <a:t> (4 000 free)</a:t>
+            </a:r>
+            <a:endParaRPr lang="en-US" dirty="0"/>
+          </a:p>
+          <a:p>
+            <a:pPr lvl="1"/>
+            <a:r>
+              <a:rPr lang="en-US" dirty="0"/>
+              <a:t>1</a:t>
+            </a:r>
+            <a:r>
+              <a:rPr lang="cs-CZ" dirty="0"/>
+              <a:t>1</a:t>
+            </a:r>
+            <a:r>
+              <a:rPr lang="en-US" dirty="0"/>
+              <a:t>9€</a:t>
+            </a:r>
+            <a:r>
+              <a:rPr lang="cs-CZ" dirty="0"/>
+              <a:t> (9</a:t>
+            </a:r>
+            <a:r>
+              <a:rPr lang="en-US" dirty="0"/>
+              <a:t>52</a:t>
+            </a:r>
+            <a:r>
+              <a:rPr lang="cs-CZ" dirty="0"/>
+              <a:t>€)</a:t>
+            </a:r>
+            <a:r>
+              <a:rPr lang="en-US" dirty="0"/>
+              <a:t> for 1 000 000 runs of standard</a:t>
+            </a:r>
+            <a:r>
+              <a:rPr lang="cs-CZ" dirty="0"/>
+              <a:t> (</a:t>
+            </a:r>
+            <a:r>
+              <a:rPr lang="cs-CZ" dirty="0" err="1"/>
+              <a:t>enterprise</a:t>
+            </a:r>
+            <a:r>
+              <a:rPr lang="cs-CZ" dirty="0"/>
+              <a:t>)</a:t>
+            </a:r>
+            <a:r>
+              <a:rPr lang="en-US" dirty="0"/>
+              <a:t> connectors</a:t>
+            </a:r>
+          </a:p>
+          <a:p>
+            <a:r>
+              <a:rPr lang="en-US" dirty="0">
+                <a:hlinkClick r:id="rId5"/>
+              </a:rPr>
               <a:t>Functions (+storage)</a:t>
             </a:r>
-            <a:endParaRPr lang="en-US" dirty="0"/>
+            <a:r>
+              <a:rPr lang="en-US" dirty="0"/>
+              <a:t> (consumption)</a:t>
+            </a:r>
           </a:p>
           <a:p>
             <a:pPr lvl="1"/>
@@ -5672,7 +5723,7 @@
             <a:pPr lvl="1"/>
             <a:r>
               <a:rPr lang="en-US" dirty="0"/>
-              <a:t>15€ for 1 000 000 GB-s = average monthly memory consumption [GB] * run [s[ (measured in </a:t>
+              <a:t>16€ for 1 000 000 GB-s = average monthly memory consumption [GB] * run [s[ (measured in </a:t>
             </a:r>
             <a:r>
               <a:rPr lang="en-US" dirty="0" err="1"/>
@@ -5687,7 +5738,7 @@
             <a:pPr lvl="1"/>
             <a:r>
               <a:rPr lang="en-US" dirty="0"/>
-              <a:t>0,19€ for 1 000 000 runs</a:t>
+              <a:t>0,191€ for 1 000 000 runs</a:t>
             </a:r>
           </a:p>
         </p:txBody>
@@ -5925,9 +5976,20 @@
               <a:rPr lang="cs-CZ" dirty="0" err="1"/>
               <a:t>driven</a:t>
             </a:r>
-            <a:r>
-              <a:rPr lang="cs-CZ" dirty="0"/>
-              <a:t> instant </a:t>
+            <a:endParaRPr lang="en-US" dirty="0"/>
+          </a:p>
+          <a:p>
+            <a:r>
+              <a:rPr lang="en-US" dirty="0"/>
+              <a:t>I</a:t>
+            </a:r>
+            <a:r>
+              <a:rPr lang="cs-CZ" dirty="0" err="1"/>
+              <a:t>nstant</a:t>
+            </a:r>
+            <a:r>
+              <a:rPr lang="cs-CZ" dirty="0"/>
+              <a:t> </a:t>
             </a:r>
             <a:r>
               <a:rPr lang="cs-CZ" dirty="0" err="1"/>
@@ -6325,6 +6387,26 @@
               <a:rPr lang="cs-CZ" dirty="0"/>
               <a:t> to market</a:t>
             </a:r>
+            <a:endParaRPr lang="en-US" dirty="0"/>
+          </a:p>
+          <a:p>
+            <a:r>
+              <a:rPr lang="en-US" dirty="0"/>
+              <a:t>Cost efficiency</a:t>
+            </a:r>
+          </a:p>
+          <a:p>
+            <a:r>
+              <a:rPr lang="en-US" dirty="0"/>
+              <a:t>Focus on core business</a:t>
+            </a:r>
+          </a:p>
+          <a:p>
+            <a:r>
+              <a:rPr lang="en-US" dirty="0"/>
+              <a:t>High availability</a:t>
+            </a:r>
+            <a:endParaRPr lang="cs-CZ" dirty="0"/>
           </a:p>
         </p:txBody>
       </p:sp>
@@ -6457,11 +6539,11 @@
           <a:p>
             <a:r>
               <a:rPr lang="cs-CZ" dirty="0"/>
-              <a:t>Monitoring </a:t>
-            </a:r>
-            <a:r>
-              <a:rPr lang="cs-CZ" dirty="0" err="1"/>
-              <a:t>out</a:t>
+              <a:t>Monitoring out </a:t>
+            </a:r>
+            <a:r>
+              <a:rPr lang="cs-CZ" dirty="0" err="1"/>
+              <a:t>of</a:t>
             </a:r>
             <a:r>
               <a:rPr lang="cs-CZ" dirty="0"/>
@@ -6469,20 +6551,32 @@
             </a:r>
             <a:r>
               <a:rPr lang="cs-CZ" dirty="0" err="1"/>
-              <a:t>of</a:t>
-            </a:r>
-            <a:r>
-              <a:rPr lang="cs-CZ" dirty="0"/>
-              <a:t> </a:t>
-            </a:r>
-            <a:r>
-              <a:rPr lang="cs-CZ" dirty="0" err="1"/>
               <a:t>the</a:t>
             </a:r>
             <a:r>
               <a:rPr lang="cs-CZ" dirty="0"/>
               <a:t> box</a:t>
             </a:r>
+            <a:endParaRPr lang="en-US" dirty="0"/>
+          </a:p>
+          <a:p>
+            <a:r>
+              <a:rPr lang="en-US" dirty="0"/>
+              <a:t>Automatic scaling</a:t>
+            </a:r>
+          </a:p>
+          <a:p>
+            <a:r>
+              <a:rPr lang="en-US" dirty="0"/>
+              <a:t>Built-in redundancy and fault tolerance</a:t>
+            </a:r>
+          </a:p>
+          <a:p>
+            <a:r>
+              <a:rPr lang="en-US" dirty="0"/>
+              <a:t>Easier collaboration</a:t>
+            </a:r>
+            <a:endParaRPr lang="cs-CZ" dirty="0"/>
           </a:p>
           <a:p>
             <a:endParaRPr lang="en-US" dirty="0"/>
@@ -6623,7 +6717,9 @@
         </p:nvSpPr>
         <p:spPr/>
         <p:txBody>
-          <a:bodyPr/>
+          <a:bodyPr>
+            <a:normAutofit lnSpcReduction="10000"/>
+          </a:bodyPr>
           <a:lstStyle/>
           <a:p>
             <a:r>
@@ -6723,6 +6819,31 @@
             <a:r>
               <a:rPr lang="cs-CZ" dirty="0" err="1"/>
               <a:t>riscs</a:t>
+            </a:r>
+            <a:endParaRPr lang="en-US" dirty="0"/>
+          </a:p>
+          <a:p>
+            <a:r>
+              <a:rPr lang="en-US" dirty="0"/>
+              <a:t>Limited control of infrastructure</a:t>
+            </a:r>
+          </a:p>
+          <a:p>
+            <a:r>
+              <a:rPr lang="en-US" dirty="0"/>
+              <a:t>Cold start latency</a:t>
+            </a:r>
+          </a:p>
+          <a:p>
+            <a:r>
+              <a:rPr lang="en-US" dirty="0"/>
+              <a:t>Higher long-term costs</a:t>
+            </a:r>
+          </a:p>
+          <a:p>
+            <a:r>
+              <a:rPr lang="en-US" dirty="0"/>
+              <a:t>Limited execution time</a:t>
             </a:r>
             <a:endParaRPr lang="cs-CZ" dirty="0"/>
           </a:p>
@@ -6775,7 +6896,9 @@
         </p:nvSpPr>
         <p:spPr/>
         <p:txBody>
-          <a:bodyPr/>
+          <a:bodyPr>
+            <a:normAutofit lnSpcReduction="10000"/>
+          </a:bodyPr>
           <a:lstStyle/>
           <a:p>
             <a:r>
@@ -6809,6 +6932,13 @@
               <a:rPr lang="cs-CZ" dirty="0" err="1"/>
               <a:t>complexity</a:t>
             </a:r>
+            <a:endParaRPr lang="en-US" dirty="0"/>
+          </a:p>
+          <a:p>
+            <a:r>
+              <a:rPr lang="en-US" dirty="0"/>
+              <a:t>Complexity of managing “state”</a:t>
+            </a:r>
             <a:endParaRPr lang="cs-CZ" dirty="0"/>
           </a:p>
           <a:p>
@@ -6854,6 +6984,14 @@
               <a:rPr lang="cs-CZ" dirty="0"/>
               <a:t> testing / debugging</a:t>
             </a:r>
+            <a:endParaRPr lang="en-US" dirty="0"/>
+          </a:p>
+          <a:p>
+            <a:r>
+              <a:rPr lang="en-US" dirty="0"/>
+              <a:t>Limited execution time</a:t>
+            </a:r>
+            <a:endParaRPr lang="cs-CZ" dirty="0"/>
           </a:p>
           <a:p>
             <a:r>
@@ -6869,6 +7007,18 @@
               <a:t>tooling</a:t>
             </a:r>
             <a:endParaRPr lang="en-US" dirty="0"/>
+          </a:p>
+          <a:p>
+            <a:r>
+              <a:rPr lang="en-US" dirty="0"/>
+              <a:t>Potential concurrency problems</a:t>
+            </a:r>
+          </a:p>
+          <a:p>
+            <a:r>
+              <a:rPr lang="en-US" dirty="0"/>
+              <a:t>Long-term maintenance</a:t>
+            </a:r>
           </a:p>
         </p:txBody>
       </p:sp>
@@ -6990,7 +7140,19 @@
               <a:rPr lang="cs-CZ" dirty="0">
                 <a:hlinkClick r:id="rId3"/>
               </a:rPr>
-              <a:t>Google Cloud </a:t>
+              <a:t>Google Cloud</a:t>
+            </a:r>
+            <a:r>
+              <a:rPr lang="en-US" dirty="0">
+                <a:hlinkClick r:id="rId3"/>
+              </a:rPr>
+              <a:t> Run</a:t>
+            </a:r>
+            <a:r>
+              <a:rPr lang="cs-CZ" dirty="0">
+                <a:hlinkClick r:id="rId3"/>
+              </a:rPr>
+              <a:t> </a:t>
             </a:r>
             <a:r>
               <a:rPr lang="cs-CZ" dirty="0" err="1">
@@ -7109,33 +7271,13 @@
             </a:r>
             <a:r>
               <a:rPr lang="cs-CZ" dirty="0"/>
-              <a:t> (Oracle)</a:t>
-            </a:r>
-          </a:p>
-          <a:p>
-            <a:r>
-              <a:rPr lang="cs-CZ" dirty="0" err="1">
-                <a:hlinkClick r:id="rId10"/>
-              </a:rPr>
-              <a:t>Kubeless</a:t>
-            </a:r>
-            <a:r>
-              <a:rPr lang="cs-CZ" dirty="0"/>
-              <a:t> (</a:t>
-            </a:r>
-            <a:r>
-              <a:rPr lang="cs-CZ" dirty="0" err="1"/>
-              <a:t>VMware</a:t>
+              <a:t> (Oracle</a:t>
             </a:r>
             <a:r>
               <a:rPr lang="en-US" dirty="0"/>
-              <a:t> -&gt; community</a:t>
-            </a:r>
-            <a:r>
-              <a:rPr lang="cs-CZ" dirty="0"/>
-              <a:t>)</a:t>
-            </a:r>
-            <a:endParaRPr lang="en-US" dirty="0"/>
+              <a:t>, open-source)</a:t>
+            </a:r>
+            <a:endParaRPr lang="cs-CZ" dirty="0"/>
           </a:p>
         </p:txBody>
       </p:sp>
@@ -7232,7 +7374,9 @@
         </p:nvSpPr>
         <p:spPr/>
         <p:txBody>
-          <a:bodyPr/>
+          <a:bodyPr>
+            <a:normAutofit fontScale="77500" lnSpcReduction="20000"/>
+          </a:bodyPr>
           <a:lstStyle/>
           <a:p>
             <a:r>
@@ -7326,6 +7470,33 @@
           </a:p>
           <a:p>
             <a:r>
+              <a:rPr lang="en-US" dirty="0"/>
+              <a:t>Service bus</a:t>
+            </a:r>
+          </a:p>
+          <a:p>
+            <a:pPr lvl="1"/>
+            <a:r>
+              <a:rPr lang="en-US" dirty="0"/>
+              <a:t>Enterprise message broker</a:t>
+            </a:r>
+          </a:p>
+          <a:p>
+            <a:pPr lvl="1"/>
+            <a:r>
+              <a:rPr lang="en-US" dirty="0"/>
+              <a:t>Point – to – point, pub / sub, request – response </a:t>
+            </a:r>
+          </a:p>
+          <a:p>
+            <a:pPr lvl="1"/>
+            <a:r>
+              <a:rPr lang="en-US" dirty="0"/>
+              <a:t>Reliable and secure</a:t>
+            </a:r>
+          </a:p>
+          <a:p>
+            <a:r>
               <a:rPr lang="cs-CZ" dirty="0" err="1"/>
               <a:t>Functions</a:t>
             </a:r>
@@ -7379,16 +7550,29 @@
             </a:r>
             <a:r>
               <a:rPr lang="cs-CZ" dirty="0"/>
-              <a:t>: C#, JavaScript, Python, Java in v2 (C#, F#, Javascript, PHP, </a:t>
-            </a:r>
-            <a:r>
-              <a:rPr lang="cs-CZ" dirty="0" err="1"/>
+              <a:t>: C#, JavaScript, Python, Java</a:t>
+            </a:r>
+            <a:r>
+              <a:rPr lang="en-US" dirty="0"/>
+              <a:t>, </a:t>
+            </a:r>
+            <a:r>
+              <a:rPr lang="en-US" dirty="0" err="1"/>
               <a:t>Powershell</a:t>
             </a:r>
             <a:r>
-              <a:rPr lang="cs-CZ" dirty="0"/>
-              <a:t> in v1)</a:t>
-            </a:r>
+              <a:rPr lang="en-US" dirty="0"/>
+              <a:t>, TypeScript, Go/Rust/other </a:t>
+            </a:r>
+            <a:r>
+              <a:rPr lang="cs-CZ" dirty="0"/>
+              <a:t>(</a:t>
+            </a:r>
+            <a:r>
+              <a:rPr lang="en-US" dirty="0"/>
+              <a:t>with custom handlers)</a:t>
+            </a:r>
+            <a:endParaRPr lang="cs-CZ" dirty="0"/>
           </a:p>
           <a:p>
             <a:r>
@@ -7404,6 +7588,13 @@
               <a:t>Apps</a:t>
             </a:r>
             <a:endParaRPr lang="cs-CZ" dirty="0"/>
+          </a:p>
+          <a:p>
+            <a:pPr lvl="1"/>
+            <a:r>
+              <a:rPr lang="en-US" dirty="0"/>
+              <a:t>“No code”</a:t>
+            </a:r>
           </a:p>
           <a:p>
             <a:pPr lvl="1"/>

</xml_diff>